<commit_message>
Update API keys and add new scripts
</commit_message>
<xml_diff>
--- a/BizPlan.pptx
+++ b/BizPlan.pptx
@@ -5,8 +5,9 @@
     <p:sldMasterId id="2147483648" r:id="rId1"/>
   </p:sldMasterIdLst>
   <p:sldIdLst>
-    <p:sldId id="256" r:id="rId2"/>
-    <p:sldId id="257" r:id="rId3"/>
+    <p:sldId id="257" r:id="rId2"/>
+    <p:sldId id="258" r:id="rId3"/>
+    <p:sldId id="256" r:id="rId4"/>
   </p:sldIdLst>
   <p:sldSz cx="12192000" cy="6858000"/>
   <p:notesSz cx="6858000" cy="9144000"/>
@@ -3310,153 +3311,6 @@
   <p:cSld>
     <p:spTree>
       <p:nvGrpSpPr>
-        <p:cNvPr id="1" name=""/>
-        <p:cNvGrpSpPr/>
-        <p:nvPr/>
-      </p:nvGrpSpPr>
-      <p:grpSpPr>
-        <a:xfrm>
-          <a:off x="0" y="0"/>
-          <a:ext cx="0" cy="0"/>
-          <a:chOff x="0" y="0"/>
-          <a:chExt cx="0" cy="0"/>
-        </a:xfrm>
-      </p:grpSpPr>
-      <p:sp>
-        <p:nvSpPr>
-          <p:cNvPr id="4" name="TextBox 3">
-            <a:extLst>
-              <a:ext uri="{FF2B5EF4-FFF2-40B4-BE49-F238E27FC236}">
-                <a16:creationId xmlns:a16="http://schemas.microsoft.com/office/drawing/2014/main" id="{C5010106-D3CA-E5B8-16B6-6300DFB42397}"/>
-              </a:ext>
-            </a:extLst>
-          </p:cNvPr>
-          <p:cNvSpPr txBox="1"/>
-          <p:nvPr/>
-        </p:nvSpPr>
-        <p:spPr>
-          <a:xfrm>
-            <a:off x="441789" y="441789"/>
-            <a:ext cx="9104031" cy="369332"/>
-          </a:xfrm>
-          <a:prstGeom prst="rect">
-            <a:avLst/>
-          </a:prstGeom>
-          <a:noFill/>
-        </p:spPr>
-        <p:txBody>
-          <a:bodyPr wrap="none" rtlCol="0">
-            <a:spAutoFit/>
-          </a:bodyPr>
-          <a:lstStyle/>
-          <a:p>
-            <a:r>
-              <a:rPr lang="en-US" dirty="0"/>
-              <a:t>Can Kestra store secure credentials? How would our solution store these types of secrets?</a:t>
-            </a:r>
-          </a:p>
-        </p:txBody>
-      </p:sp>
-      <p:sp>
-        <p:nvSpPr>
-          <p:cNvPr id="5" name="TextBox 4">
-            <a:extLst>
-              <a:ext uri="{FF2B5EF4-FFF2-40B4-BE49-F238E27FC236}">
-                <a16:creationId xmlns:a16="http://schemas.microsoft.com/office/drawing/2014/main" id="{402FA2BD-D517-6DEA-9604-D2767014B2B3}"/>
-              </a:ext>
-            </a:extLst>
-          </p:cNvPr>
-          <p:cNvSpPr txBox="1"/>
-          <p:nvPr/>
-        </p:nvSpPr>
-        <p:spPr>
-          <a:xfrm>
-            <a:off x="522270" y="1015429"/>
-            <a:ext cx="10670229" cy="646331"/>
-          </a:xfrm>
-          <a:prstGeom prst="rect">
-            <a:avLst/>
-          </a:prstGeom>
-          <a:noFill/>
-        </p:spPr>
-        <p:txBody>
-          <a:bodyPr wrap="none" rtlCol="0">
-            <a:spAutoFit/>
-          </a:bodyPr>
-          <a:lstStyle/>
-          <a:p>
-            <a:r>
-              <a:rPr lang="en-US" dirty="0"/>
-              <a:t>New airflow architecture: Worker separated from meta node – allowing more secure deployment.</a:t>
-            </a:r>
-          </a:p>
-          <a:p>
-            <a:r>
-              <a:rPr lang="en-US" dirty="0"/>
-              <a:t>https://airflow.apache.org/docs/apache-airflow/stable/core-concepts/overview.html#airflow-components</a:t>
-            </a:r>
-          </a:p>
-        </p:txBody>
-      </p:sp>
-      <p:sp>
-        <p:nvSpPr>
-          <p:cNvPr id="6" name="TextBox 5">
-            <a:extLst>
-              <a:ext uri="{FF2B5EF4-FFF2-40B4-BE49-F238E27FC236}">
-                <a16:creationId xmlns:a16="http://schemas.microsoft.com/office/drawing/2014/main" id="{2F901877-6BA2-8E40-4C01-99BB75F93462}"/>
-              </a:ext>
-            </a:extLst>
-          </p:cNvPr>
-          <p:cNvSpPr txBox="1"/>
-          <p:nvPr/>
-        </p:nvSpPr>
-        <p:spPr>
-          <a:xfrm>
-            <a:off x="686656" y="1970926"/>
-            <a:ext cx="9598718" cy="646331"/>
-          </a:xfrm>
-          <a:prstGeom prst="rect">
-            <a:avLst/>
-          </a:prstGeom>
-          <a:noFill/>
-        </p:spPr>
-        <p:txBody>
-          <a:bodyPr wrap="none" rtlCol="0">
-            <a:spAutoFit/>
-          </a:bodyPr>
-          <a:lstStyle/>
-          <a:p>
-            <a:r>
-              <a:rPr lang="en-US" dirty="0"/>
-              <a:t>Questions:</a:t>
-            </a:r>
-          </a:p>
-          <a:p>
-            <a:r>
-              <a:rPr lang="en-US" dirty="0"/>
-              <a:t>1. Would our offering be something that could be ‘sold’ on the AWS (or other CSP) marketplace?</a:t>
-            </a:r>
-          </a:p>
-        </p:txBody>
-      </p:sp>
-    </p:spTree>
-    <p:extLst>
-      <p:ext uri="{BB962C8B-B14F-4D97-AF65-F5344CB8AC3E}">
-        <p14:creationId xmlns:p14="http://schemas.microsoft.com/office/powerpoint/2010/main" val="3991456666"/>
-      </p:ext>
-    </p:extLst>
-  </p:cSld>
-  <p:clrMapOvr>
-    <a:masterClrMapping/>
-  </p:clrMapOvr>
-</p:sld>
-</file>
-
-<file path=ppt/slides/slide2.xml><?xml version="1.0" encoding="utf-8"?>
-<p:sld xmlns:a="http://schemas.openxmlformats.org/drawingml/2006/main" xmlns:r="http://schemas.openxmlformats.org/officeDocument/2006/relationships" xmlns:p="http://schemas.openxmlformats.org/presentationml/2006/main">
-  <p:cSld>
-    <p:spTree>
-      <p:nvGrpSpPr>
         <p:cNvPr id="1" name="">
           <a:extLst>
             <a:ext uri="{FF2B5EF4-FFF2-40B4-BE49-F238E27FC236}">
@@ -3747,6 +3601,9 @@
               <a:gd name="adj" fmla="val 8824"/>
             </a:avLst>
           </a:prstGeom>
+          <a:solidFill>
+            <a:schemeClr val="accent2"/>
+          </a:solidFill>
         </p:spPr>
         <p:style>
           <a:lnRef idx="1">
@@ -4045,7 +3902,7 @@
         </p:blipFill>
         <p:spPr bwMode="auto">
           <a:xfrm>
-            <a:off x="9198713" y="3177018"/>
+            <a:off x="3991843" y="2645892"/>
             <a:ext cx="914400" cy="914400"/>
           </a:xfrm>
           <a:prstGeom prst="rect">
@@ -4092,7 +3949,7 @@
         </p:blipFill>
         <p:spPr bwMode="auto">
           <a:xfrm>
-            <a:off x="8095696" y="3177018"/>
+            <a:off x="2888826" y="2645892"/>
             <a:ext cx="914400" cy="914400"/>
           </a:xfrm>
           <a:prstGeom prst="rect">
@@ -5039,10 +4896,609 @@
           </a:extLst>
         </p:spPr>
       </p:pic>
+      <p:pic>
+        <p:nvPicPr>
+          <p:cNvPr id="1072" name="Picture 48">
+            <a:extLst>
+              <a:ext uri="{FF2B5EF4-FFF2-40B4-BE49-F238E27FC236}">
+                <a16:creationId xmlns:a16="http://schemas.microsoft.com/office/drawing/2014/main" id="{0A5E976E-1933-2865-7585-792950C1F534}"/>
+              </a:ext>
+            </a:extLst>
+          </p:cNvPr>
+          <p:cNvPicPr>
+            <a:picLocks noChangeAspect="1" noChangeArrowheads="1"/>
+          </p:cNvPicPr>
+          <p:nvPr/>
+        </p:nvPicPr>
+        <p:blipFill>
+          <a:blip r:embed="rId24">
+            <a:extLst>
+              <a:ext uri="{28A0092B-C50C-407E-A947-70E740481C1C}">
+                <a14:useLocalDpi xmlns:a14="http://schemas.microsoft.com/office/drawing/2010/main" val="0"/>
+              </a:ext>
+            </a:extLst>
+          </a:blip>
+          <a:srcRect/>
+          <a:stretch/>
+        </p:blipFill>
+        <p:spPr bwMode="auto">
+          <a:xfrm>
+            <a:off x="802038" y="2946112"/>
+            <a:ext cx="703020" cy="548640"/>
+          </a:xfrm>
+          <a:prstGeom prst="rect">
+            <a:avLst/>
+          </a:prstGeom>
+          <a:noFill/>
+          <a:extLst>
+            <a:ext uri="{909E8E84-426E-40DD-AFC4-6F175D3DCCD1}">
+              <a14:hiddenFill xmlns:a14="http://schemas.microsoft.com/office/drawing/2010/main">
+                <a:solidFill>
+                  <a:srgbClr val="FFFFFF"/>
+                </a:solidFill>
+              </a14:hiddenFill>
+            </a:ext>
+          </a:extLst>
+        </p:spPr>
+      </p:pic>
+      <p:pic>
+        <p:nvPicPr>
+          <p:cNvPr id="27" name="Picture 26">
+            <a:extLst>
+              <a:ext uri="{FF2B5EF4-FFF2-40B4-BE49-F238E27FC236}">
+                <a16:creationId xmlns:a16="http://schemas.microsoft.com/office/drawing/2014/main" id="{52D9D9CC-8FAA-0FF3-0C5A-C7DCB80AD0F3}"/>
+              </a:ext>
+            </a:extLst>
+          </p:cNvPr>
+          <p:cNvPicPr>
+            <a:picLocks noChangeAspect="1"/>
+          </p:cNvPicPr>
+          <p:nvPr/>
+        </p:nvPicPr>
+        <p:blipFill>
+          <a:blip r:embed="rId25"/>
+          <a:stretch>
+            <a:fillRect/>
+          </a:stretch>
+        </p:blipFill>
+        <p:spPr>
+          <a:xfrm>
+            <a:off x="1558810" y="2946112"/>
+            <a:ext cx="548640" cy="548640"/>
+          </a:xfrm>
+          <a:prstGeom prst="rect">
+            <a:avLst/>
+          </a:prstGeom>
+        </p:spPr>
+      </p:pic>
+      <p:pic>
+        <p:nvPicPr>
+          <p:cNvPr id="1074" name="Picture 50" descr="Advanced Security dashboard Widgets ...">
+            <a:extLst>
+              <a:ext uri="{FF2B5EF4-FFF2-40B4-BE49-F238E27FC236}">
+                <a16:creationId xmlns:a16="http://schemas.microsoft.com/office/drawing/2014/main" id="{649E90CD-97B5-F1F5-822E-C707E12945F4}"/>
+              </a:ext>
+            </a:extLst>
+          </p:cNvPr>
+          <p:cNvPicPr>
+            <a:picLocks noChangeAspect="1" noChangeArrowheads="1"/>
+          </p:cNvPicPr>
+          <p:nvPr/>
+        </p:nvPicPr>
+        <p:blipFill>
+          <a:blip r:embed="rId26">
+            <a:extLst>
+              <a:ext uri="{28A0092B-C50C-407E-A947-70E740481C1C}">
+                <a14:useLocalDpi xmlns:a14="http://schemas.microsoft.com/office/drawing/2010/main" val="0"/>
+              </a:ext>
+            </a:extLst>
+          </a:blip>
+          <a:srcRect/>
+          <a:stretch>
+            <a:fillRect/>
+          </a:stretch>
+        </p:blipFill>
+        <p:spPr bwMode="auto">
+          <a:xfrm>
+            <a:off x="1593567" y="3570846"/>
+            <a:ext cx="548640" cy="548640"/>
+          </a:xfrm>
+          <a:prstGeom prst="rect">
+            <a:avLst/>
+          </a:prstGeom>
+          <a:noFill/>
+          <a:extLst>
+            <a:ext uri="{909E8E84-426E-40DD-AFC4-6F175D3DCCD1}">
+              <a14:hiddenFill xmlns:a14="http://schemas.microsoft.com/office/drawing/2010/main">
+                <a:solidFill>
+                  <a:srgbClr val="FFFFFF"/>
+                </a:solidFill>
+              </a14:hiddenFill>
+            </a:ext>
+          </a:extLst>
+        </p:spPr>
+      </p:pic>
+      <p:pic>
+        <p:nvPicPr>
+          <p:cNvPr id="1076" name="Picture 52" descr="Zero Trust Guide for Cloud-Native ...">
+            <a:extLst>
+              <a:ext uri="{FF2B5EF4-FFF2-40B4-BE49-F238E27FC236}">
+                <a16:creationId xmlns:a16="http://schemas.microsoft.com/office/drawing/2014/main" id="{3CA64B89-41DE-10C4-CB6E-AB6D861EDEAA}"/>
+              </a:ext>
+            </a:extLst>
+          </p:cNvPr>
+          <p:cNvPicPr>
+            <a:picLocks noChangeAspect="1" noChangeArrowheads="1"/>
+          </p:cNvPicPr>
+          <p:nvPr/>
+        </p:nvPicPr>
+        <p:blipFill rotWithShape="1">
+          <a:blip r:embed="rId27">
+            <a:extLst>
+              <a:ext uri="{28A0092B-C50C-407E-A947-70E740481C1C}">
+                <a14:useLocalDpi xmlns:a14="http://schemas.microsoft.com/office/drawing/2010/main" val="0"/>
+              </a:ext>
+            </a:extLst>
+          </a:blip>
+          <a:srcRect l="18873" r="18405"/>
+          <a:stretch/>
+        </p:blipFill>
+        <p:spPr bwMode="auto">
+          <a:xfrm>
+            <a:off x="9198651" y="3220432"/>
+            <a:ext cx="920228" cy="914400"/>
+          </a:xfrm>
+          <a:prstGeom prst="rect">
+            <a:avLst/>
+          </a:prstGeom>
+          <a:noFill/>
+          <a:extLst>
+            <a:ext uri="{909E8E84-426E-40DD-AFC4-6F175D3DCCD1}">
+              <a14:hiddenFill xmlns:a14="http://schemas.microsoft.com/office/drawing/2010/main">
+                <a:solidFill>
+                  <a:srgbClr val="FFFFFF"/>
+                </a:solidFill>
+              </a14:hiddenFill>
+            </a:ext>
+          </a:extLst>
+        </p:spPr>
+      </p:pic>
     </p:spTree>
     <p:extLst>
       <p:ext uri="{BB962C8B-B14F-4D97-AF65-F5344CB8AC3E}">
         <p14:creationId xmlns:p14="http://schemas.microsoft.com/office/powerpoint/2010/main" val="4128926825"/>
+      </p:ext>
+    </p:extLst>
+  </p:cSld>
+  <p:clrMapOvr>
+    <a:masterClrMapping/>
+  </p:clrMapOvr>
+</p:sld>
+</file>
+
+<file path=ppt/slides/slide2.xml><?xml version="1.0" encoding="utf-8"?>
+<p:sld xmlns:a="http://schemas.openxmlformats.org/drawingml/2006/main" xmlns:r="http://schemas.openxmlformats.org/officeDocument/2006/relationships" xmlns:p="http://schemas.openxmlformats.org/presentationml/2006/main">
+  <p:cSld>
+    <p:spTree>
+      <p:nvGrpSpPr>
+        <p:cNvPr id="1" name="">
+          <a:extLst>
+            <a:ext uri="{FF2B5EF4-FFF2-40B4-BE49-F238E27FC236}">
+              <a16:creationId xmlns:a16="http://schemas.microsoft.com/office/drawing/2014/main" id="{29E74549-ECE6-E04D-F91E-B239412B6C73}"/>
+            </a:ext>
+          </a:extLst>
+        </p:cNvPr>
+        <p:cNvGrpSpPr/>
+        <p:nvPr/>
+      </p:nvGrpSpPr>
+      <p:grpSpPr>
+        <a:xfrm>
+          <a:off x="0" y="0"/>
+          <a:ext cx="0" cy="0"/>
+          <a:chOff x="0" y="0"/>
+          <a:chExt cx="0" cy="0"/>
+        </a:xfrm>
+      </p:grpSpPr>
+      <p:sp>
+        <p:nvSpPr>
+          <p:cNvPr id="2" name="TextBox 1">
+            <a:extLst>
+              <a:ext uri="{FF2B5EF4-FFF2-40B4-BE49-F238E27FC236}">
+                <a16:creationId xmlns:a16="http://schemas.microsoft.com/office/drawing/2014/main" id="{71C2FA63-34E7-7281-7654-17589A8CD6B6}"/>
+              </a:ext>
+            </a:extLst>
+          </p:cNvPr>
+          <p:cNvSpPr txBox="1"/>
+          <p:nvPr/>
+        </p:nvSpPr>
+        <p:spPr>
+          <a:xfrm>
+            <a:off x="4730435" y="139129"/>
+            <a:ext cx="2731133" cy="461665"/>
+          </a:xfrm>
+          <a:prstGeom prst="rect">
+            <a:avLst/>
+          </a:prstGeom>
+          <a:noFill/>
+        </p:spPr>
+        <p:txBody>
+          <a:bodyPr wrap="none" rtlCol="0">
+            <a:spAutoFit/>
+          </a:bodyPr>
+          <a:lstStyle/>
+          <a:p>
+            <a:pPr algn="ctr"/>
+            <a:r>
+              <a:rPr lang="en-US" sz="2400" b="1" dirty="0"/>
+              <a:t>Customer Stories:</a:t>
+            </a:r>
+          </a:p>
+        </p:txBody>
+      </p:sp>
+      <p:sp>
+        <p:nvSpPr>
+          <p:cNvPr id="3" name="TextBox 2">
+            <a:extLst>
+              <a:ext uri="{FF2B5EF4-FFF2-40B4-BE49-F238E27FC236}">
+                <a16:creationId xmlns:a16="http://schemas.microsoft.com/office/drawing/2014/main" id="{85932AE8-BEF6-B5DC-9E23-E75CE1D22E26}"/>
+              </a:ext>
+            </a:extLst>
+          </p:cNvPr>
+          <p:cNvSpPr txBox="1"/>
+          <p:nvPr/>
+        </p:nvSpPr>
+        <p:spPr>
+          <a:xfrm>
+            <a:off x="356456" y="751726"/>
+            <a:ext cx="6080960" cy="369332"/>
+          </a:xfrm>
+          <a:prstGeom prst="rect">
+            <a:avLst/>
+          </a:prstGeom>
+          <a:noFill/>
+        </p:spPr>
+        <p:txBody>
+          <a:bodyPr wrap="none" rtlCol="0">
+            <a:spAutoFit/>
+          </a:bodyPr>
+          <a:lstStyle/>
+          <a:p>
+            <a:r>
+              <a:rPr lang="en-US" dirty="0"/>
+              <a:t>We have XYZ and are trying to do ABC, but can’t figure it out.</a:t>
+            </a:r>
+          </a:p>
+        </p:txBody>
+      </p:sp>
+      <p:sp>
+        <p:nvSpPr>
+          <p:cNvPr id="5" name="TextBox 4">
+            <a:extLst>
+              <a:ext uri="{FF2B5EF4-FFF2-40B4-BE49-F238E27FC236}">
+                <a16:creationId xmlns:a16="http://schemas.microsoft.com/office/drawing/2014/main" id="{F24778D0-6E98-36D8-D1DA-5E449D99B0B4}"/>
+              </a:ext>
+            </a:extLst>
+          </p:cNvPr>
+          <p:cNvSpPr txBox="1"/>
+          <p:nvPr/>
+        </p:nvSpPr>
+        <p:spPr>
+          <a:xfrm>
+            <a:off x="4575223" y="2348929"/>
+            <a:ext cx="3346365" cy="461665"/>
+          </a:xfrm>
+          <a:prstGeom prst="rect">
+            <a:avLst/>
+          </a:prstGeom>
+          <a:noFill/>
+        </p:spPr>
+        <p:txBody>
+          <a:bodyPr wrap="none" rtlCol="0">
+            <a:spAutoFit/>
+          </a:bodyPr>
+          <a:lstStyle/>
+          <a:p>
+            <a:pPr algn="ctr"/>
+            <a:r>
+              <a:rPr lang="en-US" sz="2400" b="1" dirty="0" err="1"/>
+              <a:t>NewCo</a:t>
+            </a:r>
+            <a:r>
+              <a:rPr lang="en-US" sz="2400" b="1" dirty="0"/>
+              <a:t> Discriminators</a:t>
+            </a:r>
+          </a:p>
+        </p:txBody>
+      </p:sp>
+      <p:sp>
+        <p:nvSpPr>
+          <p:cNvPr id="11" name="TextBox 10">
+            <a:extLst>
+              <a:ext uri="{FF2B5EF4-FFF2-40B4-BE49-F238E27FC236}">
+                <a16:creationId xmlns:a16="http://schemas.microsoft.com/office/drawing/2014/main" id="{C08C5C81-B232-C04E-51C9-E958A3534E7A}"/>
+              </a:ext>
+            </a:extLst>
+          </p:cNvPr>
+          <p:cNvSpPr txBox="1"/>
+          <p:nvPr/>
+        </p:nvSpPr>
+        <p:spPr>
+          <a:xfrm>
+            <a:off x="508856" y="2961526"/>
+            <a:ext cx="2451248" cy="369332"/>
+          </a:xfrm>
+          <a:prstGeom prst="rect">
+            <a:avLst/>
+          </a:prstGeom>
+          <a:noFill/>
+        </p:spPr>
+        <p:txBody>
+          <a:bodyPr wrap="none" rtlCol="0">
+            <a:spAutoFit/>
+          </a:bodyPr>
+          <a:lstStyle/>
+          <a:p>
+            <a:pPr marL="285750" indent="-285750">
+              <a:buFont typeface="Arial" panose="020B0604020202020204" pitchFamily="34" charset="0"/>
+              <a:buChar char="•"/>
+            </a:pPr>
+            <a:r>
+              <a:rPr lang="en-US" dirty="0"/>
+              <a:t>We do this securely.</a:t>
+            </a:r>
+          </a:p>
+        </p:txBody>
+      </p:sp>
+      <p:sp>
+        <p:nvSpPr>
+          <p:cNvPr id="13" name="TextBox 12">
+            <a:extLst>
+              <a:ext uri="{FF2B5EF4-FFF2-40B4-BE49-F238E27FC236}">
+                <a16:creationId xmlns:a16="http://schemas.microsoft.com/office/drawing/2014/main" id="{AC66CE66-68F3-970D-FEC0-9FCB191EA9E5}"/>
+              </a:ext>
+            </a:extLst>
+          </p:cNvPr>
+          <p:cNvSpPr txBox="1"/>
+          <p:nvPr/>
+        </p:nvSpPr>
+        <p:spPr>
+          <a:xfrm>
+            <a:off x="5372439" y="3711004"/>
+            <a:ext cx="2062359" cy="461665"/>
+          </a:xfrm>
+          <a:prstGeom prst="rect">
+            <a:avLst/>
+          </a:prstGeom>
+          <a:noFill/>
+        </p:spPr>
+        <p:txBody>
+          <a:bodyPr wrap="none" rtlCol="0">
+            <a:spAutoFit/>
+          </a:bodyPr>
+          <a:lstStyle/>
+          <a:p>
+            <a:pPr algn="ctr"/>
+            <a:r>
+              <a:rPr lang="en-US" sz="2400" b="1" dirty="0" err="1"/>
+              <a:t>NewCo</a:t>
+            </a:r>
+            <a:r>
+              <a:rPr lang="en-US" sz="2400" b="1" dirty="0"/>
+              <a:t> Roles</a:t>
+            </a:r>
+          </a:p>
+        </p:txBody>
+      </p:sp>
+      <p:sp>
+        <p:nvSpPr>
+          <p:cNvPr id="15" name="TextBox 14">
+            <a:extLst>
+              <a:ext uri="{FF2B5EF4-FFF2-40B4-BE49-F238E27FC236}">
+                <a16:creationId xmlns:a16="http://schemas.microsoft.com/office/drawing/2014/main" id="{CE4A734D-6D7F-55DA-A520-EE05E605FA54}"/>
+              </a:ext>
+            </a:extLst>
+          </p:cNvPr>
+          <p:cNvSpPr txBox="1"/>
+          <p:nvPr/>
+        </p:nvSpPr>
+        <p:spPr>
+          <a:xfrm>
+            <a:off x="664068" y="4323601"/>
+            <a:ext cx="3852850" cy="923330"/>
+          </a:xfrm>
+          <a:prstGeom prst="rect">
+            <a:avLst/>
+          </a:prstGeom>
+          <a:noFill/>
+        </p:spPr>
+        <p:txBody>
+          <a:bodyPr wrap="none" rtlCol="0">
+            <a:spAutoFit/>
+          </a:bodyPr>
+          <a:lstStyle/>
+          <a:p>
+            <a:pPr marL="285750" indent="-285750">
+              <a:buFont typeface="Arial" panose="020B0604020202020204" pitchFamily="34" charset="0"/>
+              <a:buChar char="•"/>
+            </a:pPr>
+            <a:r>
+              <a:rPr lang="en-US" dirty="0"/>
+              <a:t>Ryan: Cloud Engineer</a:t>
+            </a:r>
+          </a:p>
+          <a:p>
+            <a:pPr marL="285750" indent="-285750">
+              <a:buFont typeface="Arial" panose="020B0604020202020204" pitchFamily="34" charset="0"/>
+              <a:buChar char="•"/>
+            </a:pPr>
+            <a:r>
+              <a:rPr lang="en-US" dirty="0"/>
+              <a:t>Gabriel: Data Engineer</a:t>
+            </a:r>
+          </a:p>
+          <a:p>
+            <a:pPr marL="285750" indent="-285750">
+              <a:buFont typeface="Arial" panose="020B0604020202020204" pitchFamily="34" charset="0"/>
+              <a:buChar char="•"/>
+            </a:pPr>
+            <a:r>
+              <a:rPr lang="en-US" dirty="0"/>
+              <a:t>Sheen: Network/Security Engineer</a:t>
+            </a:r>
+          </a:p>
+        </p:txBody>
+      </p:sp>
+    </p:spTree>
+    <p:extLst>
+      <p:ext uri="{BB962C8B-B14F-4D97-AF65-F5344CB8AC3E}">
+        <p14:creationId xmlns:p14="http://schemas.microsoft.com/office/powerpoint/2010/main" val="1042408295"/>
+      </p:ext>
+    </p:extLst>
+  </p:cSld>
+  <p:clrMapOvr>
+    <a:masterClrMapping/>
+  </p:clrMapOvr>
+</p:sld>
+</file>
+
+<file path=ppt/slides/slide3.xml><?xml version="1.0" encoding="utf-8"?>
+<p:sld xmlns:a="http://schemas.openxmlformats.org/drawingml/2006/main" xmlns:r="http://schemas.openxmlformats.org/officeDocument/2006/relationships" xmlns:p="http://schemas.openxmlformats.org/presentationml/2006/main">
+  <p:cSld>
+    <p:spTree>
+      <p:nvGrpSpPr>
+        <p:cNvPr id="1" name=""/>
+        <p:cNvGrpSpPr/>
+        <p:nvPr/>
+      </p:nvGrpSpPr>
+      <p:grpSpPr>
+        <a:xfrm>
+          <a:off x="0" y="0"/>
+          <a:ext cx="0" cy="0"/>
+          <a:chOff x="0" y="0"/>
+          <a:chExt cx="0" cy="0"/>
+        </a:xfrm>
+      </p:grpSpPr>
+      <p:sp>
+        <p:nvSpPr>
+          <p:cNvPr id="4" name="TextBox 3">
+            <a:extLst>
+              <a:ext uri="{FF2B5EF4-FFF2-40B4-BE49-F238E27FC236}">
+                <a16:creationId xmlns:a16="http://schemas.microsoft.com/office/drawing/2014/main" id="{C5010106-D3CA-E5B8-16B6-6300DFB42397}"/>
+              </a:ext>
+            </a:extLst>
+          </p:cNvPr>
+          <p:cNvSpPr txBox="1"/>
+          <p:nvPr/>
+        </p:nvSpPr>
+        <p:spPr>
+          <a:xfrm>
+            <a:off x="441789" y="441789"/>
+            <a:ext cx="9104031" cy="369332"/>
+          </a:xfrm>
+          <a:prstGeom prst="rect">
+            <a:avLst/>
+          </a:prstGeom>
+          <a:noFill/>
+        </p:spPr>
+        <p:txBody>
+          <a:bodyPr wrap="none" rtlCol="0">
+            <a:spAutoFit/>
+          </a:bodyPr>
+          <a:lstStyle/>
+          <a:p>
+            <a:r>
+              <a:rPr lang="en-US" dirty="0"/>
+              <a:t>Can Kestra store secure credentials? How would our solution store these types of secrets?</a:t>
+            </a:r>
+          </a:p>
+        </p:txBody>
+      </p:sp>
+      <p:sp>
+        <p:nvSpPr>
+          <p:cNvPr id="5" name="TextBox 4">
+            <a:extLst>
+              <a:ext uri="{FF2B5EF4-FFF2-40B4-BE49-F238E27FC236}">
+                <a16:creationId xmlns:a16="http://schemas.microsoft.com/office/drawing/2014/main" id="{402FA2BD-D517-6DEA-9604-D2767014B2B3}"/>
+              </a:ext>
+            </a:extLst>
+          </p:cNvPr>
+          <p:cNvSpPr txBox="1"/>
+          <p:nvPr/>
+        </p:nvSpPr>
+        <p:spPr>
+          <a:xfrm>
+            <a:off x="522270" y="1015429"/>
+            <a:ext cx="10670229" cy="646331"/>
+          </a:xfrm>
+          <a:prstGeom prst="rect">
+            <a:avLst/>
+          </a:prstGeom>
+          <a:noFill/>
+        </p:spPr>
+        <p:txBody>
+          <a:bodyPr wrap="none" rtlCol="0">
+            <a:spAutoFit/>
+          </a:bodyPr>
+          <a:lstStyle/>
+          <a:p>
+            <a:r>
+              <a:rPr lang="en-US" dirty="0"/>
+              <a:t>New airflow architecture: Worker separated from meta node – allowing more secure deployment.</a:t>
+            </a:r>
+          </a:p>
+          <a:p>
+            <a:r>
+              <a:rPr lang="en-US" dirty="0"/>
+              <a:t>https://airflow.apache.org/docs/apache-airflow/stable/core-concepts/overview.html#airflow-components</a:t>
+            </a:r>
+          </a:p>
+        </p:txBody>
+      </p:sp>
+      <p:sp>
+        <p:nvSpPr>
+          <p:cNvPr id="6" name="TextBox 5">
+            <a:extLst>
+              <a:ext uri="{FF2B5EF4-FFF2-40B4-BE49-F238E27FC236}">
+                <a16:creationId xmlns:a16="http://schemas.microsoft.com/office/drawing/2014/main" id="{2F901877-6BA2-8E40-4C01-99BB75F93462}"/>
+              </a:ext>
+            </a:extLst>
+          </p:cNvPr>
+          <p:cNvSpPr txBox="1"/>
+          <p:nvPr/>
+        </p:nvSpPr>
+        <p:spPr>
+          <a:xfrm>
+            <a:off x="686656" y="1970926"/>
+            <a:ext cx="9598718" cy="646331"/>
+          </a:xfrm>
+          <a:prstGeom prst="rect">
+            <a:avLst/>
+          </a:prstGeom>
+          <a:noFill/>
+        </p:spPr>
+        <p:txBody>
+          <a:bodyPr wrap="none" rtlCol="0">
+            <a:spAutoFit/>
+          </a:bodyPr>
+          <a:lstStyle/>
+          <a:p>
+            <a:r>
+              <a:rPr lang="en-US" dirty="0"/>
+              <a:t>Questions:</a:t>
+            </a:r>
+          </a:p>
+          <a:p>
+            <a:r>
+              <a:rPr lang="en-US" dirty="0"/>
+              <a:t>1. Would our offering be something that could be ‘sold’ on the AWS (or other CSP) marketplace?</a:t>
+            </a:r>
+          </a:p>
+        </p:txBody>
+      </p:sp>
+    </p:spTree>
+    <p:extLst>
+      <p:ext uri="{BB962C8B-B14F-4D97-AF65-F5344CB8AC3E}">
+        <p14:creationId xmlns:p14="http://schemas.microsoft.com/office/powerpoint/2010/main" val="3991456666"/>
       </p:ext>
     </p:extLst>
   </p:cSld>

</xml_diff>